<commit_message>
updated with feature selections
</commit_message>
<xml_diff>
--- a/LightningPresentation/Serna_Vasquez_Lightning_v1.pptx
+++ b/LightningPresentation/Serna_Vasquez_Lightning_v1.pptx
@@ -211,7 +211,7 @@
           <a:p>
             <a:fld id="{935336F5-A68D-9A4A-83AB-B8CD6FA5C732}" type="datetimeFigureOut">
               <a:rPr lang="en-US" smtClean="0"/>
-              <a:t>9/8/2019</a:t>
+              <a:t>9/22/2019</a:t>
             </a:fld>
             <a:endParaRPr lang="en-US"/>
           </a:p>
@@ -860,7 +860,7 @@
           <a:p>
             <a:fld id="{D8AC05B1-2526-7C44-8A74-66C916069F4A}" type="datetime1">
               <a:rPr lang="en-US" smtClean="0"/>
-              <a:t>9/8/2019</a:t>
+              <a:t>9/22/2019</a:t>
             </a:fld>
             <a:endParaRPr lang="en-US"/>
           </a:p>
@@ -1051,7 +1051,7 @@
           <a:p>
             <a:fld id="{C0E5C021-D243-504D-84B8-D45D829E8B6B}" type="datetime1">
               <a:rPr lang="en-US" smtClean="0"/>
-              <a:t>9/8/2019</a:t>
+              <a:t>9/22/2019</a:t>
             </a:fld>
             <a:endParaRPr lang="en-US"/>
           </a:p>
@@ -1232,7 +1232,7 @@
           <a:p>
             <a:fld id="{B6F93F85-28A1-8344-9763-EF19E19F9128}" type="datetime1">
               <a:rPr lang="en-US" smtClean="0"/>
-              <a:t>9/8/2019</a:t>
+              <a:t>9/22/2019</a:t>
             </a:fld>
             <a:endParaRPr lang="en-US"/>
           </a:p>
@@ -1496,7 +1496,7 @@
           <a:p>
             <a:fld id="{A2B5E9FB-9AD4-754B-A772-6D3733DD5BAC}" type="datetime1">
               <a:rPr lang="en-US" smtClean="0"/>
-              <a:t>9/8/2019</a:t>
+              <a:t>9/22/2019</a:t>
             </a:fld>
             <a:endParaRPr lang="en-US"/>
           </a:p>
@@ -1739,7 +1739,7 @@
           <a:p>
             <a:fld id="{3140DF9E-9222-EE48-A64D-28DE5FAE4784}" type="datetime1">
               <a:rPr lang="en-US" smtClean="0"/>
-              <a:t>9/8/2019</a:t>
+              <a:t>9/22/2019</a:t>
             </a:fld>
             <a:endParaRPr lang="en-US"/>
           </a:p>
@@ -2117,7 +2117,7 @@
           <a:p>
             <a:fld id="{A61490FA-57A5-0041-9FDC-ACD83A9AA0E7}" type="datetime1">
               <a:rPr lang="en-US" smtClean="0"/>
-              <a:t>9/8/2019</a:t>
+              <a:t>9/22/2019</a:t>
             </a:fld>
             <a:endParaRPr lang="en-US"/>
           </a:p>
@@ -2246,7 +2246,7 @@
           <a:p>
             <a:fld id="{7E8290BC-2F66-E549-BF33-0BE20A5801B5}" type="datetime1">
               <a:rPr lang="en-US" smtClean="0"/>
-              <a:t>9/8/2019</a:t>
+              <a:t>9/22/2019</a:t>
             </a:fld>
             <a:endParaRPr lang="en-US"/>
           </a:p>
@@ -2352,7 +2352,7 @@
           <a:p>
             <a:fld id="{3BC728CC-7587-8545-9431-C9A8BB34EC62}" type="datetime1">
               <a:rPr lang="en-US" smtClean="0"/>
-              <a:t>9/8/2019</a:t>
+              <a:t>9/22/2019</a:t>
             </a:fld>
             <a:endParaRPr lang="en-US"/>
           </a:p>
@@ -2640,7 +2640,7 @@
           <a:p>
             <a:fld id="{9A66CD15-5422-0542-9CE8-BC312846333A}" type="datetime1">
               <a:rPr lang="en-US" smtClean="0"/>
-              <a:t>9/8/2019</a:t>
+              <a:t>9/22/2019</a:t>
             </a:fld>
             <a:endParaRPr lang="en-US"/>
           </a:p>
@@ -2908,7 +2908,7 @@
           <a:p>
             <a:fld id="{2A2384D1-AE54-4D4A-B83F-6EAD03BEB987}" type="datetime1">
               <a:rPr lang="en-US" smtClean="0"/>
-              <a:t>9/8/2019</a:t>
+              <a:t>9/22/2019</a:t>
             </a:fld>
             <a:endParaRPr lang="en-US"/>
           </a:p>
@@ -3876,34 +3876,11 @@
           <a:p>
             <a:r>
               <a:rPr lang="en-US" dirty="0"/>
-              <a:t>To reduce features to manageable set</a:t>
+              <a:t>Feature Selection Results</a:t>
             </a:r>
           </a:p>
           <a:p>
-            <a:r>
-              <a:rPr lang="en-US" dirty="0"/>
-              <a:t>Grid search applied after initial results</a:t>
-            </a:r>
-          </a:p>
-          <a:p>
-            <a:pPr lvl="1"/>
-            <a:r>
-              <a:rPr lang="en-US" dirty="0"/>
-              <a:t>Original features not aligned with business knowledge</a:t>
-            </a:r>
-          </a:p>
-          <a:p>
-            <a:r>
-              <a:rPr lang="en-US" dirty="0"/>
-              <a:t>Decision Tree Classifier approach used</a:t>
-            </a:r>
-          </a:p>
-          <a:p>
-            <a:pPr lvl="1"/>
-            <a:r>
-              <a:rPr lang="en-US" dirty="0"/>
-              <a:t>Top 50% quartile, 11 features explained 99% of the variance </a:t>
-            </a:r>
+            <a:endParaRPr lang="en-US" dirty="0"/>
           </a:p>
           <a:p>
             <a:endParaRPr lang="en-US" dirty="0"/>
@@ -3933,6 +3910,36 @@
           </a:p>
         </p:txBody>
       </p:sp>
+      <p:pic>
+        <p:nvPicPr>
+          <p:cNvPr id="4" name="Picture 3">
+            <a:extLst>
+              <a:ext uri="{FF2B5EF4-FFF2-40B4-BE49-F238E27FC236}">
+                <a16:creationId xmlns:a16="http://schemas.microsoft.com/office/drawing/2014/main" id="{B39C3C6E-F720-4DC4-93D6-CCF06E8532F2}"/>
+              </a:ext>
+            </a:extLst>
+          </p:cNvPr>
+          <p:cNvPicPr>
+            <a:picLocks noChangeAspect="1"/>
+          </p:cNvPicPr>
+          <p:nvPr/>
+        </p:nvPicPr>
+        <p:blipFill>
+          <a:blip r:embed="rId2"/>
+          <a:stretch>
+            <a:fillRect/>
+          </a:stretch>
+        </p:blipFill>
+        <p:spPr>
+          <a:xfrm>
+            <a:off x="2182565" y="2431760"/>
+            <a:ext cx="4020111" cy="3667637"/>
+          </a:xfrm>
+          <a:prstGeom prst="rect">
+            <a:avLst/>
+          </a:prstGeom>
+        </p:spPr>
+      </p:pic>
     </p:spTree>
     <p:extLst>
       <p:ext uri="{BB962C8B-B14F-4D97-AF65-F5344CB8AC3E}">
@@ -3989,6 +3996,13 @@
             <a:r>
               <a:rPr lang="en-US" dirty="0"/>
               <a:t>Models</a:t>
+            </a:r>
+            <a:br>
+              <a:rPr lang="en-US" dirty="0"/>
+            </a:br>
+            <a:r>
+              <a:rPr lang="en-US" dirty="0"/>
+              <a:t>No Re-Sampling</a:t>
             </a:r>
           </a:p>
         </p:txBody>

</xml_diff>